<commit_message>
Update M Han_Final presentation.pptx
</commit_message>
<xml_diff>
--- a/M Han_Final presentation.pptx
+++ b/M Han_Final presentation.pptx
@@ -15,9 +15,10 @@
     <p:sldId id="262" r:id="rId9"/>
     <p:sldId id="266" r:id="rId10"/>
     <p:sldId id="267" r:id="rId11"/>
-    <p:sldId id="270" r:id="rId12"/>
-    <p:sldId id="269" r:id="rId13"/>
-    <p:sldId id="264" r:id="rId14"/>
+    <p:sldId id="271" r:id="rId12"/>
+    <p:sldId id="270" r:id="rId13"/>
+    <p:sldId id="269" r:id="rId14"/>
+    <p:sldId id="264" r:id="rId15"/>
   </p:sldIdLst>
   <p:sldSz cx="12192000" cy="6858000"/>
   <p:notesSz cx="6858000" cy="9144000"/>
@@ -116,6 +117,11 @@
       </a:defRPr>
     </a:lvl9pPr>
   </p:defaultTextStyle>
+  <p:extLst>
+    <p:ext uri="{EFAFB233-063F-42B5-8137-9DF3F51BA10A}">
+      <p15:sldGuideLst xmlns:p15="http://schemas.microsoft.com/office/powerpoint/2012/main"/>
+    </p:ext>
+  </p:extLst>
 </p:presentation>
 </file>
 
@@ -307,7 +313,7 @@
           <a:p>
             <a:fld id="{D079866A-CB82-4A4F-8FBA-F1B81E2817CE}" type="datetimeFigureOut">
               <a:rPr lang="ko-KR" altLang="en-US" smtClean="0"/>
-              <a:t>2019-05-07</a:t>
+              <a:t>2019-05-08</a:t>
             </a:fld>
             <a:endParaRPr lang="ko-KR" altLang="en-US"/>
           </a:p>
@@ -650,7 +656,7 @@
           <a:p>
             <a:fld id="{D079866A-CB82-4A4F-8FBA-F1B81E2817CE}" type="datetimeFigureOut">
               <a:rPr lang="ko-KR" altLang="en-US" smtClean="0"/>
-              <a:t>2019-05-07</a:t>
+              <a:t>2019-05-08</a:t>
             </a:fld>
             <a:endParaRPr lang="ko-KR" altLang="en-US"/>
           </a:p>
@@ -1051,7 +1057,7 @@
           <a:p>
             <a:fld id="{D079866A-CB82-4A4F-8FBA-F1B81E2817CE}" type="datetimeFigureOut">
               <a:rPr lang="ko-KR" altLang="en-US" smtClean="0"/>
-              <a:t>2019-05-07</a:t>
+              <a:t>2019-05-08</a:t>
             </a:fld>
             <a:endParaRPr lang="ko-KR" altLang="en-US"/>
           </a:p>
@@ -1387,7 +1393,7 @@
           <a:p>
             <a:fld id="{D079866A-CB82-4A4F-8FBA-F1B81E2817CE}" type="datetimeFigureOut">
               <a:rPr lang="ko-KR" altLang="en-US" smtClean="0"/>
-              <a:t>2019-05-07</a:t>
+              <a:t>2019-05-08</a:t>
             </a:fld>
             <a:endParaRPr lang="ko-KR" altLang="en-US"/>
           </a:p>
@@ -1707,7 +1713,7 @@
           <a:p>
             <a:fld id="{D079866A-CB82-4A4F-8FBA-F1B81E2817CE}" type="datetimeFigureOut">
               <a:rPr lang="ko-KR" altLang="en-US" smtClean="0"/>
-              <a:t>2019-05-07</a:t>
+              <a:t>2019-05-08</a:t>
             </a:fld>
             <a:endParaRPr lang="ko-KR" altLang="en-US"/>
           </a:p>
@@ -2103,7 +2109,7 @@
           <a:p>
             <a:fld id="{D079866A-CB82-4A4F-8FBA-F1B81E2817CE}" type="datetimeFigureOut">
               <a:rPr lang="ko-KR" altLang="en-US" smtClean="0"/>
-              <a:t>2019-05-07</a:t>
+              <a:t>2019-05-08</a:t>
             </a:fld>
             <a:endParaRPr lang="ko-KR" altLang="en-US"/>
           </a:p>
@@ -2360,7 +2366,7 @@
           <a:p>
             <a:fld id="{D079866A-CB82-4A4F-8FBA-F1B81E2817CE}" type="datetimeFigureOut">
               <a:rPr lang="ko-KR" altLang="en-US" smtClean="0"/>
-              <a:t>2019-05-07</a:t>
+              <a:t>2019-05-08</a:t>
             </a:fld>
             <a:endParaRPr lang="ko-KR" altLang="en-US"/>
           </a:p>
@@ -2622,7 +2628,7 @@
           <a:p>
             <a:fld id="{D079866A-CB82-4A4F-8FBA-F1B81E2817CE}" type="datetimeFigureOut">
               <a:rPr lang="ko-KR" altLang="en-US" smtClean="0"/>
-              <a:t>2019-05-07</a:t>
+              <a:t>2019-05-08</a:t>
             </a:fld>
             <a:endParaRPr lang="ko-KR" altLang="en-US"/>
           </a:p>
@@ -2884,7 +2890,7 @@
           <a:p>
             <a:fld id="{D079866A-CB82-4A4F-8FBA-F1B81E2817CE}" type="datetimeFigureOut">
               <a:rPr lang="ko-KR" altLang="en-US" smtClean="0"/>
-              <a:t>2019-05-07</a:t>
+              <a:t>2019-05-08</a:t>
             </a:fld>
             <a:endParaRPr lang="ko-KR" altLang="en-US"/>
           </a:p>
@@ -3213,7 +3219,7 @@
           <a:p>
             <a:fld id="{D079866A-CB82-4A4F-8FBA-F1B81E2817CE}" type="datetimeFigureOut">
               <a:rPr lang="ko-KR" altLang="en-US" smtClean="0"/>
-              <a:t>2019-05-07</a:t>
+              <a:t>2019-05-08</a:t>
             </a:fld>
             <a:endParaRPr lang="ko-KR" altLang="en-US"/>
           </a:p>
@@ -3536,7 +3542,7 @@
           <a:p>
             <a:fld id="{D079866A-CB82-4A4F-8FBA-F1B81E2817CE}" type="datetimeFigureOut">
               <a:rPr lang="ko-KR" altLang="en-US" smtClean="0"/>
-              <a:t>2019-05-07</a:t>
+              <a:t>2019-05-08</a:t>
             </a:fld>
             <a:endParaRPr lang="ko-KR" altLang="en-US"/>
           </a:p>
@@ -3993,7 +3999,7 @@
           <a:p>
             <a:fld id="{D079866A-CB82-4A4F-8FBA-F1B81E2817CE}" type="datetimeFigureOut">
               <a:rPr lang="ko-KR" altLang="en-US" smtClean="0"/>
-              <a:t>2019-05-07</a:t>
+              <a:t>2019-05-08</a:t>
             </a:fld>
             <a:endParaRPr lang="ko-KR" altLang="en-US"/>
           </a:p>
@@ -4198,7 +4204,7 @@
           <a:p>
             <a:fld id="{D079866A-CB82-4A4F-8FBA-F1B81E2817CE}" type="datetimeFigureOut">
               <a:rPr lang="ko-KR" altLang="en-US" smtClean="0"/>
-              <a:t>2019-05-07</a:t>
+              <a:t>2019-05-08</a:t>
             </a:fld>
             <a:endParaRPr lang="ko-KR" altLang="en-US"/>
           </a:p>
@@ -4375,7 +4381,7 @@
           <a:p>
             <a:fld id="{D079866A-CB82-4A4F-8FBA-F1B81E2817CE}" type="datetimeFigureOut">
               <a:rPr lang="ko-KR" altLang="en-US" smtClean="0"/>
-              <a:t>2019-05-07</a:t>
+              <a:t>2019-05-08</a:t>
             </a:fld>
             <a:endParaRPr lang="ko-KR" altLang="en-US"/>
           </a:p>
@@ -4713,7 +4719,7 @@
           <a:p>
             <a:fld id="{D079866A-CB82-4A4F-8FBA-F1B81E2817CE}" type="datetimeFigureOut">
               <a:rPr lang="ko-KR" altLang="en-US" smtClean="0"/>
-              <a:t>2019-05-07</a:t>
+              <a:t>2019-05-08</a:t>
             </a:fld>
             <a:endParaRPr lang="ko-KR" altLang="en-US"/>
           </a:p>
@@ -5063,7 +5069,7 @@
           <a:p>
             <a:fld id="{D079866A-CB82-4A4F-8FBA-F1B81E2817CE}" type="datetimeFigureOut">
               <a:rPr lang="ko-KR" altLang="en-US" smtClean="0"/>
-              <a:t>2019-05-07</a:t>
+              <a:t>2019-05-08</a:t>
             </a:fld>
             <a:endParaRPr lang="ko-KR" altLang="en-US"/>
           </a:p>
@@ -7180,7 +7186,7 @@
           <a:p>
             <a:fld id="{D079866A-CB82-4A4F-8FBA-F1B81E2817CE}" type="datetimeFigureOut">
               <a:rPr lang="ko-KR" altLang="en-US" smtClean="0"/>
-              <a:t>2019-05-07</a:t>
+              <a:t>2019-05-08</a:t>
             </a:fld>
             <a:endParaRPr lang="ko-KR" altLang="en-US"/>
           </a:p>
@@ -7856,6 +7862,11 @@
           </p:cNvGraphicFramePr>
           <p:nvPr>
             <p:ph idx="1"/>
+            <p:extLst>
+              <p:ext uri="{D42A27DB-BD31-4B8C-83A1-F6EECF244321}">
+                <p14:modId xmlns:p14="http://schemas.microsoft.com/office/powerpoint/2010/main" val="1645012342"/>
+              </p:ext>
+            </p:extLst>
           </p:nvPr>
         </p:nvGraphicFramePr>
         <p:xfrm>
@@ -7866,7 +7877,7 @@
           <a:graphicData uri="http://schemas.openxmlformats.org/presentationml/2006/ole">
             <mc:AlternateContent xmlns:mc="http://schemas.openxmlformats.org/markup-compatibility/2006">
               <mc:Choice xmlns:v="urn:schemas-microsoft-com:vml" Requires="v">
-                <p:oleObj spid="_x0000_s3088" name="Packager Shell Object" showAsIcon="1" r:id="rId4" imgW="1319760" imgH="421560" progId="Package">
+                <p:oleObj spid="_x0000_s3092" name="Packager Shell Object" showAsIcon="1" r:id="rId4" imgW="1319760" imgH="421560" progId="Package">
                   <p:embed/>
                 </p:oleObj>
               </mc:Choice>
@@ -8241,6 +8252,98 @@
           <p:cNvPr id="2" name="Title 1">
             <a:extLst>
               <a:ext uri="{FF2B5EF4-FFF2-40B4-BE49-F238E27FC236}">
+                <a16:creationId xmlns:a16="http://schemas.microsoft.com/office/drawing/2014/main" id="{DE14A484-3F3D-432A-82A7-302D23E192A9}"/>
+              </a:ext>
+            </a:extLst>
+          </p:cNvPr>
+          <p:cNvSpPr>
+            <a:spLocks noGrp="1"/>
+          </p:cNvSpPr>
+          <p:nvPr>
+            <p:ph type="title"/>
+          </p:nvPr>
+        </p:nvSpPr>
+        <p:spPr/>
+        <p:txBody>
+          <a:bodyPr/>
+          <a:lstStyle/>
+          <a:p>
+            <a:pPr algn="ctr"/>
+            <a:r>
+              <a:rPr lang="en-US" altLang="ko-KR" dirty="0"/>
+              <a:t>the best &amp; the worst restaurants</a:t>
+            </a:r>
+            <a:endParaRPr lang="ko-KR" altLang="en-US" dirty="0"/>
+          </a:p>
+        </p:txBody>
+      </p:sp>
+      <p:pic>
+        <p:nvPicPr>
+          <p:cNvPr id="4" name="Content Placeholder 3">
+            <a:extLst>
+              <a:ext uri="{FF2B5EF4-FFF2-40B4-BE49-F238E27FC236}">
+                <a16:creationId xmlns:a16="http://schemas.microsoft.com/office/drawing/2014/main" id="{A0A2710A-0DD7-4ACA-A372-FF999CA038A9}"/>
+              </a:ext>
+            </a:extLst>
+          </p:cNvPr>
+          <p:cNvPicPr>
+            <a:picLocks noGrp="1" noChangeAspect="1"/>
+          </p:cNvPicPr>
+          <p:nvPr>
+            <p:ph idx="1"/>
+          </p:nvPr>
+        </p:nvPicPr>
+        <p:blipFill>
+          <a:blip r:embed="rId2"/>
+          <a:stretch>
+            <a:fillRect/>
+          </a:stretch>
+        </p:blipFill>
+        <p:spPr>
+          <a:xfrm>
+            <a:off x="1225118" y="1340528"/>
+            <a:ext cx="10688715" cy="5228948"/>
+          </a:xfrm>
+          <a:prstGeom prst="rect">
+            <a:avLst/>
+          </a:prstGeom>
+        </p:spPr>
+      </p:pic>
+    </p:spTree>
+    <p:extLst>
+      <p:ext uri="{BB962C8B-B14F-4D97-AF65-F5344CB8AC3E}">
+        <p14:creationId xmlns:p14="http://schemas.microsoft.com/office/powerpoint/2010/main" val="249935795"/>
+      </p:ext>
+    </p:extLst>
+  </p:cSld>
+  <p:clrMapOvr>
+    <a:masterClrMapping/>
+  </p:clrMapOvr>
+</p:sld>
+</file>
+
+<file path=ppt/slides/slide12.xml><?xml version="1.0" encoding="utf-8"?>
+<p:sld xmlns:a="http://schemas.openxmlformats.org/drawingml/2006/main" xmlns:r="http://schemas.openxmlformats.org/officeDocument/2006/relationships" xmlns:p="http://schemas.openxmlformats.org/presentationml/2006/main">
+  <p:cSld>
+    <p:spTree>
+      <p:nvGrpSpPr>
+        <p:cNvPr id="1" name=""/>
+        <p:cNvGrpSpPr/>
+        <p:nvPr/>
+      </p:nvGrpSpPr>
+      <p:grpSpPr>
+        <a:xfrm>
+          <a:off x="0" y="0"/>
+          <a:ext cx="0" cy="0"/>
+          <a:chOff x="0" y="0"/>
+          <a:chExt cx="0" cy="0"/>
+        </a:xfrm>
+      </p:grpSpPr>
+      <p:sp>
+        <p:nvSpPr>
+          <p:cNvPr id="2" name="Title 1">
+            <a:extLst>
+              <a:ext uri="{FF2B5EF4-FFF2-40B4-BE49-F238E27FC236}">
                 <a16:creationId xmlns:a16="http://schemas.microsoft.com/office/drawing/2014/main" id="{A8BDCE82-A9ED-423E-BB5A-3ED1675C7542}"/>
               </a:ext>
             </a:extLst>
@@ -8296,7 +8399,7 @@
           <a:graphicData uri="http://schemas.openxmlformats.org/presentationml/2006/ole">
             <mc:AlternateContent xmlns:mc="http://schemas.openxmlformats.org/markup-compatibility/2006">
               <mc:Choice xmlns:v="urn:schemas-microsoft-com:vml" Requires="v">
-                <p:oleObj spid="_x0000_s4112" name="Packager Shell Object" showAsIcon="1" r:id="rId4" imgW="1319760" imgH="421560" progId="Package">
+                <p:oleObj spid="_x0000_s4116" name="Packager Shell Object" showAsIcon="1" r:id="rId4" imgW="1319760" imgH="421560" progId="Package">
                   <p:embed/>
                 </p:oleObj>
               </mc:Choice>
@@ -8561,136 +8664,6 @@
 </p:sld>
 </file>
 
-<file path=ppt/slides/slide12.xml><?xml version="1.0" encoding="utf-8"?>
-<p:sld xmlns:a="http://schemas.openxmlformats.org/drawingml/2006/main" xmlns:r="http://schemas.openxmlformats.org/officeDocument/2006/relationships" xmlns:p="http://schemas.openxmlformats.org/presentationml/2006/main">
-  <p:cSld>
-    <p:spTree>
-      <p:nvGrpSpPr>
-        <p:cNvPr id="1" name=""/>
-        <p:cNvGrpSpPr/>
-        <p:nvPr/>
-      </p:nvGrpSpPr>
-      <p:grpSpPr>
-        <a:xfrm>
-          <a:off x="0" y="0"/>
-          <a:ext cx="0" cy="0"/>
-          <a:chOff x="0" y="0"/>
-          <a:chExt cx="0" cy="0"/>
-        </a:xfrm>
-      </p:grpSpPr>
-      <p:sp>
-        <p:nvSpPr>
-          <p:cNvPr id="2" name="Title 1">
-            <a:extLst>
-              <a:ext uri="{FF2B5EF4-FFF2-40B4-BE49-F238E27FC236}">
-                <a16:creationId xmlns:a16="http://schemas.microsoft.com/office/drawing/2014/main" id="{A8BDCE82-A9ED-423E-BB5A-3ED1675C7542}"/>
-              </a:ext>
-            </a:extLst>
-          </p:cNvPr>
-          <p:cNvSpPr>
-            <a:spLocks noGrp="1"/>
-          </p:cNvSpPr>
-          <p:nvPr>
-            <p:ph type="title"/>
-          </p:nvPr>
-        </p:nvSpPr>
-        <p:spPr/>
-        <p:txBody>
-          <a:bodyPr/>
-          <a:lstStyle/>
-          <a:p>
-            <a:pPr algn="ctr"/>
-            <a:r>
-              <a:rPr lang="en-US" altLang="ko-KR" dirty="0"/>
-              <a:t>Conclusion</a:t>
-            </a:r>
-            <a:endParaRPr lang="ko-KR" altLang="en-US" dirty="0"/>
-          </a:p>
-        </p:txBody>
-      </p:sp>
-      <p:sp>
-        <p:nvSpPr>
-          <p:cNvPr id="3" name="Content Placeholder 2">
-            <a:extLst>
-              <a:ext uri="{FF2B5EF4-FFF2-40B4-BE49-F238E27FC236}">
-                <a16:creationId xmlns:a16="http://schemas.microsoft.com/office/drawing/2014/main" id="{6EA1806C-BBA8-45E3-A303-04499A57C002}"/>
-              </a:ext>
-            </a:extLst>
-          </p:cNvPr>
-          <p:cNvSpPr>
-            <a:spLocks noGrp="1"/>
-          </p:cNvSpPr>
-          <p:nvPr>
-            <p:ph idx="1"/>
-          </p:nvPr>
-        </p:nvSpPr>
-        <p:spPr>
-          <a:xfrm>
-            <a:off x="2589212" y="2133599"/>
-            <a:ext cx="8915400" cy="4349087"/>
-          </a:xfrm>
-        </p:spPr>
-        <p:txBody>
-          <a:bodyPr>
-            <a:normAutofit/>
-          </a:bodyPr>
-          <a:lstStyle/>
-          <a:p>
-            <a:r>
-              <a:rPr lang="en-US" altLang="ko-KR" dirty="0">
-                <a:latin typeface="Helvetica Neue"/>
-              </a:rPr>
-              <a:t>Restaurants that we see as the best restaurants on Yelp.com do not necessarily have the best inspection results. </a:t>
-            </a:r>
-          </a:p>
-          <a:p>
-            <a:pPr>
-              <a:buFontTx/>
-              <a:buChar char="-"/>
-            </a:pPr>
-            <a:endParaRPr lang="en-US" altLang="ko-KR" dirty="0">
-              <a:latin typeface="Helvetica Neue"/>
-            </a:endParaRPr>
-          </a:p>
-          <a:p>
-            <a:r>
-              <a:rPr lang="en-US" altLang="ko-KR" dirty="0">
-                <a:latin typeface="Helvetica Neue"/>
-              </a:rPr>
-              <a:t>Yelp's star ratings and reviews are frequently used to decide where to eat outside home in our everyday life, however, by doing this project, I learned that the Yelp's star ratings and reviews mentioning great taste, service or convenient distance do not guarantee the safety of food they serve and the respective restaurant's compliance with the City and State food safety regulations. </a:t>
-            </a:r>
-          </a:p>
-          <a:p>
-            <a:endParaRPr lang="en-US" altLang="ko-KR" dirty="0">
-              <a:latin typeface="Helvetica Neue"/>
-            </a:endParaRPr>
-          </a:p>
-          <a:p>
-            <a:r>
-              <a:rPr lang="en-US" altLang="ko-KR" dirty="0">
-                <a:latin typeface="Helvetica Neue"/>
-              </a:rPr>
-              <a:t>I suggest that we should refer to the Health Department's restaurant inspection result once we pick a restaurant based on the Yelp as a starting point to ensure we are having food that is safe to eat, and prepared in safe environments.</a:t>
-            </a:r>
-            <a:endParaRPr lang="ko-KR" altLang="en-US" dirty="0">
-              <a:latin typeface="Helvetica Neue"/>
-            </a:endParaRPr>
-          </a:p>
-        </p:txBody>
-      </p:sp>
-    </p:spTree>
-    <p:extLst>
-      <p:ext uri="{BB962C8B-B14F-4D97-AF65-F5344CB8AC3E}">
-        <p14:creationId xmlns:p14="http://schemas.microsoft.com/office/powerpoint/2010/main" val="1490120191"/>
-      </p:ext>
-    </p:extLst>
-  </p:cSld>
-  <p:clrMapOvr>
-    <a:masterClrMapping/>
-  </p:clrMapOvr>
-</p:sld>
-</file>
-
 <file path=ppt/slides/slide13.xml><?xml version="1.0" encoding="utf-8"?>
 <p:sld xmlns:a="http://schemas.openxmlformats.org/drawingml/2006/main" xmlns:r="http://schemas.openxmlformats.org/officeDocument/2006/relationships" xmlns:p="http://schemas.openxmlformats.org/presentationml/2006/main">
   <p:cSld>
@@ -8732,7 +8705,7 @@
             <a:pPr algn="ctr"/>
             <a:r>
               <a:rPr lang="en-US" altLang="ko-KR" dirty="0"/>
-              <a:t>References</a:t>
+              <a:t>Conclusion</a:t>
             </a:r>
             <a:endParaRPr lang="ko-KR" altLang="en-US" dirty="0"/>
           </a:p>
@@ -8756,8 +8729,138 @@
         </p:nvSpPr>
         <p:spPr>
           <a:xfrm>
-            <a:off x="1801504" y="1266967"/>
-            <a:ext cx="10235820" cy="5475027"/>
+            <a:off x="2589212" y="2133599"/>
+            <a:ext cx="8915400" cy="4349087"/>
+          </a:xfrm>
+        </p:spPr>
+        <p:txBody>
+          <a:bodyPr>
+            <a:normAutofit/>
+          </a:bodyPr>
+          <a:lstStyle/>
+          <a:p>
+            <a:r>
+              <a:rPr lang="en-US" altLang="ko-KR" dirty="0">
+                <a:latin typeface="Helvetica Neue"/>
+              </a:rPr>
+              <a:t>Restaurants that we see as the best restaurants on Yelp.com do not necessarily have the best inspection results. </a:t>
+            </a:r>
+          </a:p>
+          <a:p>
+            <a:pPr>
+              <a:buFontTx/>
+              <a:buChar char="-"/>
+            </a:pPr>
+            <a:endParaRPr lang="en-US" altLang="ko-KR" dirty="0">
+              <a:latin typeface="Helvetica Neue"/>
+            </a:endParaRPr>
+          </a:p>
+          <a:p>
+            <a:r>
+              <a:rPr lang="en-US" altLang="ko-KR" dirty="0">
+                <a:latin typeface="Helvetica Neue"/>
+              </a:rPr>
+              <a:t>Yelp's star ratings and reviews are frequently used to decide where to eat outside home in our everyday life, however, by doing this project, I learned that the Yelp's star ratings and reviews mentioning great taste, service or convenient distance do not guarantee the safety of food they serve and the respective restaurant's compliance with the City and State food safety regulations. </a:t>
+            </a:r>
+          </a:p>
+          <a:p>
+            <a:endParaRPr lang="en-US" altLang="ko-KR" dirty="0">
+              <a:latin typeface="Helvetica Neue"/>
+            </a:endParaRPr>
+          </a:p>
+          <a:p>
+            <a:r>
+              <a:rPr lang="en-US" altLang="ko-KR" dirty="0">
+                <a:latin typeface="Helvetica Neue"/>
+              </a:rPr>
+              <a:t>I suggest that we should refer to the Health Department's restaurant inspection result once we pick a restaurant based on the Yelp as a starting point to ensure we are having food that is safe to eat, and prepared in safe environments.</a:t>
+            </a:r>
+            <a:endParaRPr lang="ko-KR" altLang="en-US" dirty="0">
+              <a:latin typeface="Helvetica Neue"/>
+            </a:endParaRPr>
+          </a:p>
+        </p:txBody>
+      </p:sp>
+    </p:spTree>
+    <p:extLst>
+      <p:ext uri="{BB962C8B-B14F-4D97-AF65-F5344CB8AC3E}">
+        <p14:creationId xmlns:p14="http://schemas.microsoft.com/office/powerpoint/2010/main" val="1490120191"/>
+      </p:ext>
+    </p:extLst>
+  </p:cSld>
+  <p:clrMapOvr>
+    <a:masterClrMapping/>
+  </p:clrMapOvr>
+</p:sld>
+</file>
+
+<file path=ppt/slides/slide14.xml><?xml version="1.0" encoding="utf-8"?>
+<p:sld xmlns:a="http://schemas.openxmlformats.org/drawingml/2006/main" xmlns:r="http://schemas.openxmlformats.org/officeDocument/2006/relationships" xmlns:p="http://schemas.openxmlformats.org/presentationml/2006/main">
+  <p:cSld>
+    <p:spTree>
+      <p:nvGrpSpPr>
+        <p:cNvPr id="1" name=""/>
+        <p:cNvGrpSpPr/>
+        <p:nvPr/>
+      </p:nvGrpSpPr>
+      <p:grpSpPr>
+        <a:xfrm>
+          <a:off x="0" y="0"/>
+          <a:ext cx="0" cy="0"/>
+          <a:chOff x="0" y="0"/>
+          <a:chExt cx="0" cy="0"/>
+        </a:xfrm>
+      </p:grpSpPr>
+      <p:sp>
+        <p:nvSpPr>
+          <p:cNvPr id="2" name="Title 1">
+            <a:extLst>
+              <a:ext uri="{FF2B5EF4-FFF2-40B4-BE49-F238E27FC236}">
+                <a16:creationId xmlns:a16="http://schemas.microsoft.com/office/drawing/2014/main" id="{A8BDCE82-A9ED-423E-BB5A-3ED1675C7542}"/>
+              </a:ext>
+            </a:extLst>
+          </p:cNvPr>
+          <p:cNvSpPr>
+            <a:spLocks noGrp="1"/>
+          </p:cNvSpPr>
+          <p:nvPr>
+            <p:ph type="title"/>
+          </p:nvPr>
+        </p:nvSpPr>
+        <p:spPr/>
+        <p:txBody>
+          <a:bodyPr/>
+          <a:lstStyle/>
+          <a:p>
+            <a:pPr algn="ctr"/>
+            <a:r>
+              <a:rPr lang="en-US" altLang="ko-KR" dirty="0"/>
+              <a:t>References</a:t>
+            </a:r>
+            <a:endParaRPr lang="ko-KR" altLang="en-US" dirty="0"/>
+          </a:p>
+        </p:txBody>
+      </p:sp>
+      <p:sp>
+        <p:nvSpPr>
+          <p:cNvPr id="3" name="Content Placeholder 2">
+            <a:extLst>
+              <a:ext uri="{FF2B5EF4-FFF2-40B4-BE49-F238E27FC236}">
+                <a16:creationId xmlns:a16="http://schemas.microsoft.com/office/drawing/2014/main" id="{6EA1806C-BBA8-45E3-A303-04499A57C002}"/>
+              </a:ext>
+            </a:extLst>
+          </p:cNvPr>
+          <p:cNvSpPr>
+            <a:spLocks noGrp="1"/>
+          </p:cNvSpPr>
+          <p:nvPr>
+            <p:ph idx="1"/>
+          </p:nvPr>
+        </p:nvSpPr>
+        <p:spPr>
+          <a:xfrm>
+            <a:off x="1801504" y="1970843"/>
+            <a:ext cx="10235820" cy="4263047"/>
           </a:xfrm>
         </p:spPr>
         <p:txBody>
@@ -8786,11 +8889,6 @@
             </a:endParaRPr>
           </a:p>
           <a:p>
-            <a:endParaRPr lang="en-US" altLang="ko-KR" sz="1300" dirty="0">
-              <a:latin typeface="Helvetica Neue"/>
-            </a:endParaRPr>
-          </a:p>
-          <a:p>
             <a:r>
               <a:rPr lang="en-US" altLang="ko-KR" sz="1300" dirty="0">
                 <a:latin typeface="Helvetica Neue"/>
@@ -8810,11 +8908,6 @@
             </a:endParaRPr>
           </a:p>
           <a:p>
-            <a:endParaRPr lang="en-US" altLang="ko-KR" sz="1300" dirty="0">
-              <a:latin typeface="Helvetica Neue"/>
-            </a:endParaRPr>
-          </a:p>
-          <a:p>
             <a:r>
               <a:rPr lang="en-US" altLang="ko-KR" sz="1300" dirty="0">
                 <a:latin typeface="Helvetica Neue"/>
@@ -8831,11 +8924,6 @@
             </a:r>
           </a:p>
           <a:p>
-            <a:endParaRPr lang="en-US" altLang="ko-KR" sz="1300" dirty="0">
-              <a:latin typeface="Helvetica Neue"/>
-            </a:endParaRPr>
-          </a:p>
-          <a:p>
             <a:r>
               <a:rPr lang="en-US" altLang="ko-KR" sz="1300" dirty="0">
                 <a:latin typeface="Helvetica Neue"/>
@@ -8864,11 +8952,6 @@
             </a:r>
           </a:p>
           <a:p>
-            <a:endParaRPr lang="en-US" altLang="ko-KR" sz="1300" dirty="0">
-              <a:latin typeface="Helvetica Neue"/>
-            </a:endParaRPr>
-          </a:p>
-          <a:p>
             <a:r>
               <a:rPr lang="en-US" altLang="ko-KR" sz="1300" dirty="0">
                 <a:latin typeface="Helvetica Neue"/>
@@ -8883,11 +8966,6 @@
               </a:rPr>
               <a:t>https://www.crainsnewyork.com/article/20180412/BLOGS01/180419940/burdens-abound-but-nyc-restaurants-numbers-are-growing</a:t>
             </a:r>
-          </a:p>
-          <a:p>
-            <a:endParaRPr lang="en-US" altLang="ko-KR" sz="1300" dirty="0">
-              <a:latin typeface="Helvetica Neue"/>
-            </a:endParaRPr>
           </a:p>
           <a:p>
             <a:r>
@@ -9932,71 +10010,6 @@
           </a:p>
         </p:txBody>
       </p:sp>
-      <p:graphicFrame>
-        <p:nvGraphicFramePr>
-          <p:cNvPr id="4" name="Content Placeholder 3">
-            <a:hlinkClick r:id="rId3" action="ppaction://hlinkfile"/>
-            <a:extLst>
-              <a:ext uri="{FF2B5EF4-FFF2-40B4-BE49-F238E27FC236}">
-                <a16:creationId xmlns:a16="http://schemas.microsoft.com/office/drawing/2014/main" id="{E7BF8BBF-0BB4-4B9D-9031-481E06429CCC}"/>
-              </a:ext>
-            </a:extLst>
-          </p:cNvPr>
-          <p:cNvGraphicFramePr>
-            <a:graphicFrameLocks noGrp="1" noChangeAspect="1"/>
-          </p:cNvGraphicFramePr>
-          <p:nvPr>
-            <p:ph idx="1"/>
-            <p:extLst>
-              <p:ext uri="{D42A27DB-BD31-4B8C-83A1-F6EECF244321}">
-                <p14:modId xmlns:p14="http://schemas.microsoft.com/office/powerpoint/2010/main" val="1120001240"/>
-              </p:ext>
-            </p:extLst>
-          </p:nvPr>
-        </p:nvGraphicFramePr>
-        <p:xfrm>
-          <a:off x="10185399" y="842280"/>
-          <a:ext cx="1319213" cy="422275"/>
-        </p:xfrm>
-        <a:graphic>
-          <a:graphicData uri="http://schemas.openxmlformats.org/presentationml/2006/ole">
-            <mc:AlternateContent xmlns:mc="http://schemas.openxmlformats.org/markup-compatibility/2006">
-              <mc:Choice xmlns:v="urn:schemas-microsoft-com:vml" Requires="v">
-                <p:oleObj spid="_x0000_s1060" name="Packager Shell Object" showAsIcon="1" r:id="rId4" imgW="1319760" imgH="421560" progId="Package">
-                  <p:embed/>
-                </p:oleObj>
-              </mc:Choice>
-              <mc:Fallback>
-                <p:oleObj name="Packager Shell Object" showAsIcon="1" r:id="rId4" imgW="1319760" imgH="421560" progId="Package">
-                  <p:embed/>
-                  <p:pic>
-                    <p:nvPicPr>
-                      <p:cNvPr id="0" name=""/>
-                      <p:cNvPicPr/>
-                      <p:nvPr/>
-                    </p:nvPicPr>
-                    <p:blipFill>
-                      <a:blip r:embed="rId5"/>
-                      <a:stretch>
-                        <a:fillRect/>
-                      </a:stretch>
-                    </p:blipFill>
-                    <p:spPr>
-                      <a:xfrm>
-                        <a:off x="10185399" y="842280"/>
-                        <a:ext cx="1319213" cy="422275"/>
-                      </a:xfrm>
-                      <a:prstGeom prst="rect">
-                        <a:avLst/>
-                      </a:prstGeom>
-                    </p:spPr>
-                  </p:pic>
-                </p:oleObj>
-              </mc:Fallback>
-            </mc:AlternateContent>
-          </a:graphicData>
-        </a:graphic>
-      </p:graphicFrame>
       <p:pic>
         <p:nvPicPr>
           <p:cNvPr id="5" name="Picture 4">
@@ -10012,7 +10025,7 @@
           <p:nvPr/>
         </p:nvPicPr>
         <p:blipFill>
-          <a:blip r:embed="rId6"/>
+          <a:blip r:embed="rId2"/>
           <a:stretch>
             <a:fillRect/>
           </a:stretch>
@@ -10078,7 +10091,7 @@
           <p:nvPr/>
         </p:nvPicPr>
         <p:blipFill>
-          <a:blip r:embed="rId7"/>
+          <a:blip r:embed="rId3"/>
           <a:stretch>
             <a:fillRect/>
           </a:stretch>
@@ -10166,6 +10179,31 @@
               <a:t>Available on Yelp, CROWN FRIED CHICKEN has star rating of 1.5 and the review count is only 4, although the restaurant inspection result describes this restaurant as one of the top 5 in terms of compliance with the food safety regulations.</a:t>
             </a:r>
             <a:endParaRPr lang="ko-KR" altLang="en-US" dirty="0"/>
+          </a:p>
+        </p:txBody>
+      </p:sp>
+      <p:sp>
+        <p:nvSpPr>
+          <p:cNvPr id="6" name="Content Placeholder 5">
+            <a:extLst>
+              <a:ext uri="{FF2B5EF4-FFF2-40B4-BE49-F238E27FC236}">
+                <a16:creationId xmlns:a16="http://schemas.microsoft.com/office/drawing/2014/main" id="{BCA7FD63-47F9-4A67-8529-5CAE62ECA7A4}"/>
+              </a:ext>
+            </a:extLst>
+          </p:cNvPr>
+          <p:cNvSpPr>
+            <a:spLocks noGrp="1"/>
+          </p:cNvSpPr>
+          <p:nvPr>
+            <p:ph idx="1"/>
+          </p:nvPr>
+        </p:nvSpPr>
+        <p:spPr/>
+        <p:txBody>
+          <a:bodyPr/>
+          <a:lstStyle/>
+          <a:p>
+            <a:endParaRPr lang="ko-KR" altLang="en-US"/>
           </a:p>
         </p:txBody>
       </p:sp>
@@ -10229,73 +10267,6 @@
           </a:p>
         </p:txBody>
       </p:sp>
-      <p:graphicFrame>
-        <p:nvGraphicFramePr>
-          <p:cNvPr id="4" name="Content Placeholder 3">
-            <a:hlinkClick r:id="rId3" action="ppaction://hlinkfile"/>
-            <a:extLst>
-              <a:ext uri="{FF2B5EF4-FFF2-40B4-BE49-F238E27FC236}">
-                <a16:creationId xmlns:a16="http://schemas.microsoft.com/office/drawing/2014/main" id="{E7BF8BBF-0BB4-4B9D-9031-481E06429CCC}"/>
-              </a:ext>
-            </a:extLst>
-          </p:cNvPr>
-          <p:cNvGraphicFramePr>
-            <a:graphicFrameLocks noGrp="1" noChangeAspect="1"/>
-          </p:cNvGraphicFramePr>
-          <p:nvPr>
-            <p:ph idx="1"/>
-          </p:nvPr>
-        </p:nvGraphicFramePr>
-        <p:xfrm>
-          <a:off x="10185399" y="842280"/>
-          <a:ext cx="1319213" cy="422275"/>
-        </p:xfrm>
-        <a:graphic>
-          <a:graphicData uri="http://schemas.openxmlformats.org/presentationml/2006/ole">
-            <mc:AlternateContent xmlns:mc="http://schemas.openxmlformats.org/markup-compatibility/2006">
-              <mc:Choice xmlns:v="urn:schemas-microsoft-com:vml" Requires="v">
-                <p:oleObj spid="_x0000_s2066" name="Packager Shell Object" showAsIcon="1" r:id="rId4" imgW="1319760" imgH="421560" progId="Package">
-                  <p:embed/>
-                </p:oleObj>
-              </mc:Choice>
-              <mc:Fallback>
-                <p:oleObj name="Packager Shell Object" showAsIcon="1" r:id="rId4" imgW="1319760" imgH="421560" progId="Package">
-                  <p:embed/>
-                  <p:pic>
-                    <p:nvPicPr>
-                      <p:cNvPr id="4" name="Content Placeholder 3">
-                        <a:hlinkClick r:id="" action="ppaction://hlinkfile"/>
-                        <a:extLst>
-                          <a:ext uri="{FF2B5EF4-FFF2-40B4-BE49-F238E27FC236}">
-                            <a16:creationId xmlns:a16="http://schemas.microsoft.com/office/drawing/2014/main" id="{E7BF8BBF-0BB4-4B9D-9031-481E06429CCC}"/>
-                          </a:ext>
-                        </a:extLst>
-                      </p:cNvPr>
-                      <p:cNvPicPr/>
-                      <p:nvPr/>
-                    </p:nvPicPr>
-                    <p:blipFill>
-                      <a:blip r:embed="rId5"/>
-                      <a:stretch>
-                        <a:fillRect/>
-                      </a:stretch>
-                    </p:blipFill>
-                    <p:spPr>
-                      <a:xfrm>
-                        <a:off x="10185399" y="842280"/>
-                        <a:ext cx="1319213" cy="422275"/>
-                      </a:xfrm>
-                      <a:prstGeom prst="rect">
-                        <a:avLst/>
-                      </a:prstGeom>
-                    </p:spPr>
-                  </p:pic>
-                </p:oleObj>
-              </mc:Fallback>
-            </mc:AlternateContent>
-          </a:graphicData>
-        </a:graphic>
-      </p:graphicFrame>
       <p:pic>
         <p:nvPicPr>
           <p:cNvPr id="6" name="Picture 5">
@@ -10311,7 +10282,7 @@
           <p:nvPr/>
         </p:nvPicPr>
         <p:blipFill>
-          <a:blip r:embed="rId6"/>
+          <a:blip r:embed="rId2"/>
           <a:stretch>
             <a:fillRect/>
           </a:stretch>
@@ -10377,7 +10348,7 @@
           <p:nvPr/>
         </p:nvPicPr>
         <p:blipFill>
-          <a:blip r:embed="rId7"/>
+          <a:blip r:embed="rId3"/>
           <a:stretch>
             <a:fillRect/>
           </a:stretch>
@@ -10477,6 +10448,31 @@
               <a:t>This is surprising as the star rating of the best restaurant CROWN FRIED CHICKEN was 1.5 and the review count was only 4 according to Yelp.</a:t>
             </a:r>
             <a:endParaRPr lang="ko-KR" altLang="en-US" dirty="0"/>
+          </a:p>
+        </p:txBody>
+      </p:sp>
+      <p:sp>
+        <p:nvSpPr>
+          <p:cNvPr id="7" name="Content Placeholder 6">
+            <a:extLst>
+              <a:ext uri="{FF2B5EF4-FFF2-40B4-BE49-F238E27FC236}">
+                <a16:creationId xmlns:a16="http://schemas.microsoft.com/office/drawing/2014/main" id="{A7ABCE28-D945-4D4A-908F-2BC7D8E739DD}"/>
+              </a:ext>
+            </a:extLst>
+          </p:cNvPr>
+          <p:cNvSpPr>
+            <a:spLocks noGrp="1"/>
+          </p:cNvSpPr>
+          <p:nvPr>
+            <p:ph idx="1"/>
+          </p:nvPr>
+        </p:nvSpPr>
+        <p:spPr/>
+        <p:txBody>
+          <a:bodyPr/>
+          <a:lstStyle/>
+          <a:p>
+            <a:endParaRPr lang="ko-KR" altLang="en-US"/>
           </a:p>
         </p:txBody>
       </p:sp>

</xml_diff>